<commit_message>
Added better example for this
</commit_message>
<xml_diff>
--- a/TypeScriptBasics.pptx
+++ b/TypeScriptBasics.pptx
@@ -12043,8 +12043,12 @@
               <a:buChar char="-"/>
             </a:pPr>
             <a:r>
-              <a:rPr lang="de-DE" dirty="0"/>
-              <a:t>Implizite Übergabe:</a:t>
+              <a:rPr lang="de-DE"/>
+              <a:t>Implizite </a:t>
+            </a:r>
+            <a:r>
+              <a:rPr lang="de-DE" dirty="0"/>
+              <a:t>Übergabe:</a:t>
             </a:r>
           </a:p>
           <a:p>

</xml_diff>

<commit_message>
Added never to TypeScript Typen
</commit_message>
<xml_diff>
--- a/TypeScriptBasics.pptx
+++ b/TypeScriptBasics.pptx
@@ -1384,6 +1384,96 @@
     <p:extLst>
       <p:ext uri="{BB962C8B-B14F-4D97-AF65-F5344CB8AC3E}">
         <p14:creationId xmlns:p14="http://schemas.microsoft.com/office/powerpoint/2010/main" val="3469212084"/>
+      </p:ext>
+    </p:extLst>
+  </p:cSld>
+  <p:clrMapOvr>
+    <a:masterClrMapping/>
+  </p:clrMapOvr>
+</p:notes>
+</file>
+
+<file path=ppt/notesSlides/notesSlide18.xml><?xml version="1.0" encoding="utf-8"?>
+<p:notes xmlns:a="http://schemas.openxmlformats.org/drawingml/2006/main" xmlns:r="http://schemas.openxmlformats.org/officeDocument/2006/relationships" xmlns:p="http://schemas.openxmlformats.org/presentationml/2006/main">
+  <p:cSld>
+    <p:spTree>
+      <p:nvGrpSpPr>
+        <p:cNvPr id="1" name=""/>
+        <p:cNvGrpSpPr/>
+        <p:nvPr/>
+      </p:nvGrpSpPr>
+      <p:grpSpPr>
+        <a:xfrm>
+          <a:off x="0" y="0"/>
+          <a:ext cx="0" cy="0"/>
+          <a:chOff x="0" y="0"/>
+          <a:chExt cx="0" cy="0"/>
+        </a:xfrm>
+      </p:grpSpPr>
+      <p:sp>
+        <p:nvSpPr>
+          <p:cNvPr id="2" name="Folienbildplatzhalter 1"/>
+          <p:cNvSpPr>
+            <a:spLocks noGrp="1" noRot="1" noChangeAspect="1"/>
+          </p:cNvSpPr>
+          <p:nvPr>
+            <p:ph type="sldImg"/>
+          </p:nvPr>
+        </p:nvSpPr>
+        <p:spPr/>
+      </p:sp>
+      <p:sp>
+        <p:nvSpPr>
+          <p:cNvPr id="3" name="Notizenplatzhalter 2"/>
+          <p:cNvSpPr>
+            <a:spLocks noGrp="1"/>
+          </p:cNvSpPr>
+          <p:nvPr>
+            <p:ph type="body" idx="1"/>
+          </p:nvPr>
+        </p:nvSpPr>
+        <p:spPr/>
+        <p:txBody>
+          <a:bodyPr/>
+          <a:lstStyle/>
+          <a:p>
+            <a:r>
+              <a:rPr lang="de-DE" dirty="0"/>
+              <a:t>Typen existieren nur zur Entwicklung (gehen beim transpilieren verloren)</a:t>
+            </a:r>
+          </a:p>
+          <a:p>
+            <a:endParaRPr lang="de-DE" dirty="0"/>
+          </a:p>
+        </p:txBody>
+      </p:sp>
+      <p:sp>
+        <p:nvSpPr>
+          <p:cNvPr id="4" name="Foliennummernplatzhalter 3"/>
+          <p:cNvSpPr>
+            <a:spLocks noGrp="1"/>
+          </p:cNvSpPr>
+          <p:nvPr>
+            <p:ph type="sldNum" sz="quarter" idx="10"/>
+          </p:nvPr>
+        </p:nvSpPr>
+        <p:spPr/>
+        <p:txBody>
+          <a:bodyPr/>
+          <a:lstStyle/>
+          <a:p>
+            <a:fld id="{C0663104-BBBB-4823-99BF-1DB3B469CAD1}" type="slidenum">
+              <a:rPr lang="de-DE" smtClean="0"/>
+              <a:t>23</a:t>
+            </a:fld>
+            <a:endParaRPr lang="de-DE"/>
+          </a:p>
+        </p:txBody>
+      </p:sp>
+    </p:spTree>
+    <p:extLst>
+      <p:ext uri="{BB962C8B-B14F-4D97-AF65-F5344CB8AC3E}">
+        <p14:creationId xmlns:p14="http://schemas.microsoft.com/office/powerpoint/2010/main" val="4032013435"/>
       </p:ext>
     </p:extLst>
   </p:cSld>
@@ -13346,7 +13436,110 @@
           <a:bodyPr/>
           <a:lstStyle/>
           <a:p>
-            <a:endParaRPr lang="de-DE"/>
+            <a:pPr marL="285750" indent="-285750">
+              <a:buFontTx/>
+              <a:buChar char="-"/>
+            </a:pPr>
+            <a:r>
+              <a:rPr lang="de-DE" dirty="0"/>
+              <a:t>String</a:t>
+            </a:r>
+          </a:p>
+          <a:p>
+            <a:pPr marL="285750" indent="-285750">
+              <a:buFontTx/>
+              <a:buChar char="-"/>
+            </a:pPr>
+            <a:r>
+              <a:rPr lang="de-DE" dirty="0" err="1"/>
+              <a:t>Number</a:t>
+            </a:r>
+            <a:endParaRPr lang="de-DE" dirty="0"/>
+          </a:p>
+          <a:p>
+            <a:pPr marL="285750" indent="-285750">
+              <a:buFontTx/>
+              <a:buChar char="-"/>
+            </a:pPr>
+            <a:r>
+              <a:rPr lang="de-DE" dirty="0"/>
+              <a:t>Boolean</a:t>
+            </a:r>
+          </a:p>
+          <a:p>
+            <a:pPr marL="285750" indent="-285750">
+              <a:buFontTx/>
+              <a:buChar char="-"/>
+            </a:pPr>
+            <a:r>
+              <a:rPr lang="de-DE" dirty="0"/>
+              <a:t>Array</a:t>
+            </a:r>
+          </a:p>
+          <a:p>
+            <a:pPr marL="285750" indent="-285750">
+              <a:buFontTx/>
+              <a:buChar char="-"/>
+            </a:pPr>
+            <a:r>
+              <a:rPr lang="de-DE" dirty="0" err="1"/>
+              <a:t>Tuple</a:t>
+            </a:r>
+            <a:endParaRPr lang="de-DE" dirty="0"/>
+          </a:p>
+          <a:p>
+            <a:pPr marL="285750" indent="-285750">
+              <a:buFontTx/>
+              <a:buChar char="-"/>
+            </a:pPr>
+            <a:r>
+              <a:rPr lang="de-DE" dirty="0" err="1"/>
+              <a:t>Enums</a:t>
+            </a:r>
+            <a:endParaRPr lang="de-DE" dirty="0"/>
+          </a:p>
+          <a:p>
+            <a:pPr marL="285750" indent="-285750">
+              <a:buFontTx/>
+              <a:buChar char="-"/>
+            </a:pPr>
+            <a:r>
+              <a:rPr lang="de-DE" dirty="0"/>
+              <a:t>Any</a:t>
+            </a:r>
+          </a:p>
+          <a:p>
+            <a:pPr marL="285750" indent="-285750">
+              <a:buFontTx/>
+              <a:buChar char="-"/>
+            </a:pPr>
+            <a:r>
+              <a:rPr lang="de-DE" dirty="0" err="1"/>
+              <a:t>Function</a:t>
+            </a:r>
+            <a:endParaRPr lang="de-DE" dirty="0"/>
+          </a:p>
+          <a:p>
+            <a:pPr marL="285750" indent="-285750">
+              <a:buFontTx/>
+              <a:buChar char="-"/>
+            </a:pPr>
+            <a:r>
+              <a:rPr lang="de-DE" dirty="0" err="1"/>
+              <a:t>Object</a:t>
+            </a:r>
+            <a:endParaRPr lang="de-DE" dirty="0"/>
+          </a:p>
+          <a:p>
+            <a:pPr marL="285750" indent="-285750">
+              <a:buFontTx/>
+              <a:buChar char="-"/>
+            </a:pPr>
+            <a:r>
+              <a:rPr lang="de-DE"/>
+              <a:t>Never</a:t>
+            </a:r>
+            <a:endParaRPr lang="de-DE" dirty="0"/>
           </a:p>
         </p:txBody>
       </p:sp>

</xml_diff>

<commit_message>
Added Namespaces and Modules
</commit_message>
<xml_diff>
--- a/TypeScriptBasics.pptx
+++ b/TypeScriptBasics.pptx
@@ -5,7 +5,7 @@
     <p:sldMasterId id="2147483660" r:id="rId1"/>
   </p:sldMasterIdLst>
   <p:notesMasterIdLst>
-    <p:notesMasterId r:id="rId36"/>
+    <p:notesMasterId r:id="rId39"/>
   </p:notesMasterIdLst>
   <p:sldIdLst>
     <p:sldId id="259" r:id="rId2"/>
@@ -39,9 +39,12 @@
     <p:sldId id="291" r:id="rId30"/>
     <p:sldId id="292" r:id="rId31"/>
     <p:sldId id="293" r:id="rId32"/>
-    <p:sldId id="290" r:id="rId33"/>
-    <p:sldId id="268" r:id="rId34"/>
-    <p:sldId id="260" r:id="rId35"/>
+    <p:sldId id="294" r:id="rId33"/>
+    <p:sldId id="295" r:id="rId34"/>
+    <p:sldId id="296" r:id="rId35"/>
+    <p:sldId id="290" r:id="rId36"/>
+    <p:sldId id="268" r:id="rId37"/>
+    <p:sldId id="260" r:id="rId38"/>
   </p:sldIdLst>
   <p:sldSz cx="12192000" cy="6858000"/>
   <p:notesSz cx="6858000" cy="9144000"/>
@@ -2015,7 +2018,7 @@
           <a:p>
             <a:fld id="{C0663104-BBBB-4823-99BF-1DB3B469CAD1}" type="slidenum">
               <a:rPr lang="de-DE" smtClean="0"/>
-              <a:t>32</a:t>
+              <a:t>35</a:t>
             </a:fld>
             <a:endParaRPr lang="de-DE"/>
           </a:p>
@@ -16113,12 +16116,8 @@
               <a:buChar char="-"/>
             </a:pPr>
             <a:r>
-              <a:rPr lang="de-DE"/>
-              <a:t>Properties </a:t>
-            </a:r>
-            <a:r>
-              <a:rPr lang="de-DE" dirty="0"/>
-              <a:t>sind typisiert</a:t>
+              <a:rPr lang="de-DE" dirty="0"/>
+              <a:t>Properties sind typisiert</a:t>
             </a:r>
           </a:p>
           <a:p>
@@ -16182,31 +16181,6 @@
               <a:buFontTx/>
               <a:buChar char="-"/>
             </a:pPr>
-            <a:endParaRPr lang="de-DE" dirty="0"/>
-          </a:p>
-          <a:p>
-            <a:pPr marL="285750" indent="-285750">
-              <a:buFontTx/>
-              <a:buChar char="-"/>
-            </a:pPr>
-            <a:r>
-              <a:rPr lang="de-DE" dirty="0"/>
-              <a:t>Polymorphismus</a:t>
-            </a:r>
-          </a:p>
-          <a:p>
-            <a:pPr marL="285750" indent="-285750">
-              <a:buFontTx/>
-              <a:buChar char="-"/>
-            </a:pPr>
-            <a:r>
-              <a:rPr lang="de-DE" dirty="0"/>
-              <a:t>Duck </a:t>
-            </a:r>
-            <a:r>
-              <a:rPr lang="de-DE" dirty="0" err="1"/>
-              <a:t>Typing</a:t>
-            </a:r>
             <a:endParaRPr lang="de-DE" dirty="0"/>
           </a:p>
         </p:txBody>
@@ -16333,7 +16307,7 @@
           <p:cNvPr id="2" name="Titel 1">
             <a:extLst>
               <a:ext uri="{FF2B5EF4-FFF2-40B4-BE49-F238E27FC236}">
-                <a16:creationId xmlns:a16="http://schemas.microsoft.com/office/drawing/2014/main" id="{648681C9-71A1-4E71-A107-37917662F5A6}"/>
+                <a16:creationId xmlns:a16="http://schemas.microsoft.com/office/drawing/2014/main" id="{53A9C705-FEC0-4763-8AD5-0F16CE73AD4A}"/>
               </a:ext>
             </a:extLst>
           </p:cNvPr>
@@ -16351,7 +16325,7 @@
           <a:p>
             <a:r>
               <a:rPr lang="de-DE" dirty="0"/>
-              <a:t>Funktionen höherer Ordnung</a:t>
+              <a:t>Klassen</a:t>
             </a:r>
           </a:p>
         </p:txBody>
@@ -16361,7 +16335,7 @@
           <p:cNvPr id="3" name="Inhaltsplatzhalter 2">
             <a:extLst>
               <a:ext uri="{FF2B5EF4-FFF2-40B4-BE49-F238E27FC236}">
-                <a16:creationId xmlns:a16="http://schemas.microsoft.com/office/drawing/2014/main" id="{F97B25CF-A5FF-4B0F-885D-93B361B61166}"/>
+                <a16:creationId xmlns:a16="http://schemas.microsoft.com/office/drawing/2014/main" id="{CE03FD3B-F1E7-4089-BFA3-5092F858E654}"/>
               </a:ext>
             </a:extLst>
           </p:cNvPr>
@@ -16374,45 +16348,25 @@
         </p:nvSpPr>
         <p:spPr/>
         <p:txBody>
-          <a:bodyPr/>
+          <a:bodyPr anchor="ctr"/>
           <a:lstStyle/>
           <a:p>
-            <a:pPr marL="285750" indent="-285750">
-              <a:buFontTx/>
-              <a:buChar char="-"/>
-            </a:pPr>
-            <a:r>
-              <a:rPr lang="de-DE" dirty="0"/>
-              <a:t>Funktionen können als Parameter übergeben werden</a:t>
-            </a:r>
-          </a:p>
-          <a:p>
-            <a:pPr marL="285750" indent="-285750">
-              <a:buFontTx/>
-              <a:buChar char="-"/>
-            </a:pPr>
-            <a:r>
-              <a:rPr lang="de-DE" dirty="0"/>
-              <a:t>TODO</a:t>
-            </a:r>
-          </a:p>
-          <a:p>
-            <a:pPr marL="285750" indent="-285750">
-              <a:buFontTx/>
-              <a:buChar char="-"/>
-            </a:pPr>
-            <a:r>
-              <a:rPr lang="de-DE"/>
-              <a:t>https://www.heise.de/developer/artikel/Konsole-Funktionen-hoeherer-Ordnung-1958717.html</a:t>
-            </a:r>
-            <a:endParaRPr lang="de-DE" dirty="0"/>
+            <a:pPr algn="ctr"/>
+            <a:r>
+              <a:rPr lang="de-DE" sz="6000" dirty="0">
+                <a:solidFill>
+                  <a:srgbClr val="FF0000"/>
+                </a:solidFill>
+              </a:rPr>
+              <a:t>ÜBUNG?</a:t>
+            </a:r>
           </a:p>
         </p:txBody>
       </p:sp>
     </p:spTree>
     <p:extLst>
       <p:ext uri="{BB962C8B-B14F-4D97-AF65-F5344CB8AC3E}">
-        <p14:creationId xmlns:p14="http://schemas.microsoft.com/office/powerpoint/2010/main" val="2708215138"/>
+        <p14:creationId xmlns:p14="http://schemas.microsoft.com/office/powerpoint/2010/main" val="4159146999"/>
       </p:ext>
     </p:extLst>
   </p:cSld>
@@ -16444,6 +16398,374 @@
           <p:cNvPr id="2" name="Titel 1">
             <a:extLst>
               <a:ext uri="{FF2B5EF4-FFF2-40B4-BE49-F238E27FC236}">
+                <a16:creationId xmlns:a16="http://schemas.microsoft.com/office/drawing/2014/main" id="{04FE455D-A66C-4BA9-B430-E96416D86570}"/>
+              </a:ext>
+            </a:extLst>
+          </p:cNvPr>
+          <p:cNvSpPr>
+            <a:spLocks noGrp="1"/>
+          </p:cNvSpPr>
+          <p:nvPr>
+            <p:ph type="title"/>
+          </p:nvPr>
+        </p:nvSpPr>
+        <p:spPr/>
+        <p:txBody>
+          <a:bodyPr/>
+          <a:lstStyle/>
+          <a:p>
+            <a:r>
+              <a:rPr lang="de-DE" dirty="0" err="1"/>
+              <a:t>NameSpaces</a:t>
+            </a:r>
+            <a:r>
+              <a:rPr lang="de-DE" dirty="0"/>
+              <a:t> und Modules</a:t>
+            </a:r>
+          </a:p>
+        </p:txBody>
+      </p:sp>
+      <p:sp>
+        <p:nvSpPr>
+          <p:cNvPr id="3" name="Inhaltsplatzhalter 2">
+            <a:extLst>
+              <a:ext uri="{FF2B5EF4-FFF2-40B4-BE49-F238E27FC236}">
+                <a16:creationId xmlns:a16="http://schemas.microsoft.com/office/drawing/2014/main" id="{F1B6381C-4FCA-401B-BDFC-B15EF4F65DCD}"/>
+              </a:ext>
+            </a:extLst>
+          </p:cNvPr>
+          <p:cNvSpPr>
+            <a:spLocks noGrp="1"/>
+          </p:cNvSpPr>
+          <p:nvPr>
+            <p:ph sz="quarter" idx="11"/>
+          </p:nvPr>
+        </p:nvSpPr>
+        <p:spPr/>
+        <p:txBody>
+          <a:bodyPr/>
+          <a:lstStyle/>
+          <a:p>
+            <a:pPr marL="285750" indent="-285750">
+              <a:buFontTx/>
+              <a:buChar char="-"/>
+            </a:pPr>
+            <a:r>
+              <a:rPr lang="de-DE" dirty="0"/>
+              <a:t>Helfen dabei, den Code zu strukturieren</a:t>
+            </a:r>
+          </a:p>
+          <a:p>
+            <a:pPr marL="285750" indent="-285750">
+              <a:buFontTx/>
+              <a:buChar char="-"/>
+            </a:pPr>
+            <a:r>
+              <a:rPr lang="de-DE" dirty="0"/>
+              <a:t>Beugen </a:t>
+            </a:r>
+            <a:r>
+              <a:rPr lang="de-DE" dirty="0" err="1"/>
+              <a:t>Naming</a:t>
+            </a:r>
+            <a:r>
+              <a:rPr lang="de-DE" dirty="0"/>
+              <a:t> </a:t>
+            </a:r>
+            <a:r>
+              <a:rPr lang="de-DE" dirty="0" err="1"/>
+              <a:t>Collisions</a:t>
+            </a:r>
+            <a:r>
+              <a:rPr lang="de-DE" dirty="0"/>
+              <a:t> vor</a:t>
+            </a:r>
+          </a:p>
+          <a:p>
+            <a:pPr marL="285750" indent="-285750">
+              <a:buFontTx/>
+              <a:buChar char="-"/>
+            </a:pPr>
+            <a:r>
+              <a:rPr lang="de-DE" dirty="0" err="1"/>
+              <a:t>Namespaces</a:t>
+            </a:r>
+            <a:r>
+              <a:rPr lang="de-DE" dirty="0"/>
+              <a:t> sind gut für kleinere Projekte</a:t>
+            </a:r>
+          </a:p>
+          <a:p>
+            <a:pPr marL="468276" lvl="1" indent="-285750">
+              <a:buFontTx/>
+              <a:buChar char="-"/>
+            </a:pPr>
+            <a:r>
+              <a:rPr lang="de-DE" dirty="0"/>
+              <a:t>Nicht so restriktiv wie Modules, kann schnell unübersichtlich werden</a:t>
+            </a:r>
+          </a:p>
+          <a:p>
+            <a:pPr marL="468276" lvl="1" indent="-285750">
+              <a:buFontTx/>
+              <a:buChar char="-"/>
+            </a:pPr>
+            <a:endParaRPr lang="de-DE" dirty="0"/>
+          </a:p>
+          <a:p>
+            <a:pPr marL="285750" indent="-285750">
+              <a:buFontTx/>
+              <a:buChar char="-"/>
+            </a:pPr>
+            <a:r>
+              <a:rPr lang="de-DE" dirty="0"/>
+              <a:t>Modules &gt; </a:t>
+            </a:r>
+            <a:r>
+              <a:rPr lang="de-DE" dirty="0" err="1"/>
+              <a:t>Namespaces</a:t>
+            </a:r>
+            <a:endParaRPr lang="de-DE" dirty="0"/>
+          </a:p>
+        </p:txBody>
+      </p:sp>
+    </p:spTree>
+    <p:extLst>
+      <p:ext uri="{BB962C8B-B14F-4D97-AF65-F5344CB8AC3E}">
+        <p14:creationId xmlns:p14="http://schemas.microsoft.com/office/powerpoint/2010/main" val="1932991495"/>
+      </p:ext>
+    </p:extLst>
+  </p:cSld>
+  <p:clrMapOvr>
+    <a:masterClrMapping/>
+  </p:clrMapOvr>
+</p:sld>
+</file>
+
+<file path=ppt/slides/slide34.xml><?xml version="1.0" encoding="utf-8"?>
+<p:sld xmlns:a="http://schemas.openxmlformats.org/drawingml/2006/main" xmlns:r="http://schemas.openxmlformats.org/officeDocument/2006/relationships" xmlns:p="http://schemas.openxmlformats.org/presentationml/2006/main">
+  <p:cSld>
+    <p:spTree>
+      <p:nvGrpSpPr>
+        <p:cNvPr id="1" name=""/>
+        <p:cNvGrpSpPr/>
+        <p:nvPr/>
+      </p:nvGrpSpPr>
+      <p:grpSpPr>
+        <a:xfrm>
+          <a:off x="0" y="0"/>
+          <a:ext cx="0" cy="0"/>
+          <a:chOff x="0" y="0"/>
+          <a:chExt cx="0" cy="0"/>
+        </a:xfrm>
+      </p:grpSpPr>
+      <p:sp>
+        <p:nvSpPr>
+          <p:cNvPr id="2" name="Titel 1">
+            <a:extLst>
+              <a:ext uri="{FF2B5EF4-FFF2-40B4-BE49-F238E27FC236}">
+                <a16:creationId xmlns:a16="http://schemas.microsoft.com/office/drawing/2014/main" id="{04FE455D-A66C-4BA9-B430-E96416D86570}"/>
+              </a:ext>
+            </a:extLst>
+          </p:cNvPr>
+          <p:cNvSpPr>
+            <a:spLocks noGrp="1"/>
+          </p:cNvSpPr>
+          <p:nvPr>
+            <p:ph type="title"/>
+          </p:nvPr>
+        </p:nvSpPr>
+        <p:spPr/>
+        <p:txBody>
+          <a:bodyPr/>
+          <a:lstStyle/>
+          <a:p>
+            <a:r>
+              <a:rPr lang="de-DE" dirty="0" err="1"/>
+              <a:t>NameSpaces</a:t>
+            </a:r>
+            <a:r>
+              <a:rPr lang="de-DE" dirty="0"/>
+              <a:t> und Modules</a:t>
+            </a:r>
+          </a:p>
+        </p:txBody>
+      </p:sp>
+      <p:sp>
+        <p:nvSpPr>
+          <p:cNvPr id="3" name="Inhaltsplatzhalter 2">
+            <a:extLst>
+              <a:ext uri="{FF2B5EF4-FFF2-40B4-BE49-F238E27FC236}">
+                <a16:creationId xmlns:a16="http://schemas.microsoft.com/office/drawing/2014/main" id="{F1B6381C-4FCA-401B-BDFC-B15EF4F65DCD}"/>
+              </a:ext>
+            </a:extLst>
+          </p:cNvPr>
+          <p:cNvSpPr>
+            <a:spLocks noGrp="1"/>
+          </p:cNvSpPr>
+          <p:nvPr>
+            <p:ph sz="quarter" idx="11"/>
+          </p:nvPr>
+        </p:nvSpPr>
+        <p:spPr/>
+        <p:txBody>
+          <a:bodyPr anchor="ctr"/>
+          <a:lstStyle/>
+          <a:p>
+            <a:pPr algn="ctr"/>
+            <a:r>
+              <a:rPr lang="de-DE" sz="6000" dirty="0"/>
+              <a:t>DEMO</a:t>
+            </a:r>
+          </a:p>
+        </p:txBody>
+      </p:sp>
+    </p:spTree>
+    <p:extLst>
+      <p:ext uri="{BB962C8B-B14F-4D97-AF65-F5344CB8AC3E}">
+        <p14:creationId xmlns:p14="http://schemas.microsoft.com/office/powerpoint/2010/main" val="1009980574"/>
+      </p:ext>
+    </p:extLst>
+  </p:cSld>
+  <p:clrMapOvr>
+    <a:masterClrMapping/>
+  </p:clrMapOvr>
+</p:sld>
+</file>
+
+<file path=ppt/slides/slide35.xml><?xml version="1.0" encoding="utf-8"?>
+<p:sld xmlns:a="http://schemas.openxmlformats.org/drawingml/2006/main" xmlns:r="http://schemas.openxmlformats.org/officeDocument/2006/relationships" xmlns:p="http://schemas.openxmlformats.org/presentationml/2006/main">
+  <p:cSld>
+    <p:spTree>
+      <p:nvGrpSpPr>
+        <p:cNvPr id="1" name=""/>
+        <p:cNvGrpSpPr/>
+        <p:nvPr/>
+      </p:nvGrpSpPr>
+      <p:grpSpPr>
+        <a:xfrm>
+          <a:off x="0" y="0"/>
+          <a:ext cx="0" cy="0"/>
+          <a:chOff x="0" y="0"/>
+          <a:chExt cx="0" cy="0"/>
+        </a:xfrm>
+      </p:grpSpPr>
+      <p:sp>
+        <p:nvSpPr>
+          <p:cNvPr id="2" name="Titel 1">
+            <a:extLst>
+              <a:ext uri="{FF2B5EF4-FFF2-40B4-BE49-F238E27FC236}">
+                <a16:creationId xmlns:a16="http://schemas.microsoft.com/office/drawing/2014/main" id="{648681C9-71A1-4E71-A107-37917662F5A6}"/>
+              </a:ext>
+            </a:extLst>
+          </p:cNvPr>
+          <p:cNvSpPr>
+            <a:spLocks noGrp="1"/>
+          </p:cNvSpPr>
+          <p:nvPr>
+            <p:ph type="title"/>
+          </p:nvPr>
+        </p:nvSpPr>
+        <p:spPr/>
+        <p:txBody>
+          <a:bodyPr/>
+          <a:lstStyle/>
+          <a:p>
+            <a:r>
+              <a:rPr lang="de-DE" dirty="0"/>
+              <a:t>Funktionen höherer Ordnung</a:t>
+            </a:r>
+          </a:p>
+        </p:txBody>
+      </p:sp>
+      <p:sp>
+        <p:nvSpPr>
+          <p:cNvPr id="3" name="Inhaltsplatzhalter 2">
+            <a:extLst>
+              <a:ext uri="{FF2B5EF4-FFF2-40B4-BE49-F238E27FC236}">
+                <a16:creationId xmlns:a16="http://schemas.microsoft.com/office/drawing/2014/main" id="{F97B25CF-A5FF-4B0F-885D-93B361B61166}"/>
+              </a:ext>
+            </a:extLst>
+          </p:cNvPr>
+          <p:cNvSpPr>
+            <a:spLocks noGrp="1"/>
+          </p:cNvSpPr>
+          <p:nvPr>
+            <p:ph sz="quarter" idx="11"/>
+          </p:nvPr>
+        </p:nvSpPr>
+        <p:spPr/>
+        <p:txBody>
+          <a:bodyPr/>
+          <a:lstStyle/>
+          <a:p>
+            <a:pPr marL="285750" indent="-285750">
+              <a:buFontTx/>
+              <a:buChar char="-"/>
+            </a:pPr>
+            <a:r>
+              <a:rPr lang="de-DE" dirty="0"/>
+              <a:t>Funktionen können als Parameter übergeben werden</a:t>
+            </a:r>
+          </a:p>
+          <a:p>
+            <a:pPr marL="285750" indent="-285750">
+              <a:buFontTx/>
+              <a:buChar char="-"/>
+            </a:pPr>
+            <a:r>
+              <a:rPr lang="de-DE" dirty="0"/>
+              <a:t>TODO</a:t>
+            </a:r>
+          </a:p>
+          <a:p>
+            <a:pPr marL="285750" indent="-285750">
+              <a:buFontTx/>
+              <a:buChar char="-"/>
+            </a:pPr>
+            <a:r>
+              <a:rPr lang="de-DE"/>
+              <a:t>https://www.heise.de/developer/artikel/Konsole-Funktionen-hoeherer-Ordnung-1958717.html</a:t>
+            </a:r>
+            <a:endParaRPr lang="de-DE" dirty="0"/>
+          </a:p>
+        </p:txBody>
+      </p:sp>
+    </p:spTree>
+    <p:extLst>
+      <p:ext uri="{BB962C8B-B14F-4D97-AF65-F5344CB8AC3E}">
+        <p14:creationId xmlns:p14="http://schemas.microsoft.com/office/powerpoint/2010/main" val="2708215138"/>
+      </p:ext>
+    </p:extLst>
+  </p:cSld>
+  <p:clrMapOvr>
+    <a:masterClrMapping/>
+  </p:clrMapOvr>
+</p:sld>
+</file>
+
+<file path=ppt/slides/slide36.xml><?xml version="1.0" encoding="utf-8"?>
+<p:sld xmlns:a="http://schemas.openxmlformats.org/drawingml/2006/main" xmlns:r="http://schemas.openxmlformats.org/officeDocument/2006/relationships" xmlns:p="http://schemas.openxmlformats.org/presentationml/2006/main">
+  <p:cSld>
+    <p:spTree>
+      <p:nvGrpSpPr>
+        <p:cNvPr id="1" name=""/>
+        <p:cNvGrpSpPr/>
+        <p:nvPr/>
+      </p:nvGrpSpPr>
+      <p:grpSpPr>
+        <a:xfrm>
+          <a:off x="0" y="0"/>
+          <a:ext cx="0" cy="0"/>
+          <a:chOff x="0" y="0"/>
+          <a:chExt cx="0" cy="0"/>
+        </a:xfrm>
+      </p:grpSpPr>
+      <p:sp>
+        <p:nvSpPr>
+          <p:cNvPr id="2" name="Titel 1">
+            <a:extLst>
+              <a:ext uri="{FF2B5EF4-FFF2-40B4-BE49-F238E27FC236}">
                 <a16:creationId xmlns:a16="http://schemas.microsoft.com/office/drawing/2014/main" id="{EE08B43D-448C-433E-9870-51D5660D16EA}"/>
               </a:ext>
             </a:extLst>
@@ -16560,7 +16882,7 @@
 </p:sld>
 </file>
 
-<file path=ppt/slides/slide34.xml><?xml version="1.0" encoding="utf-8"?>
+<file path=ppt/slides/slide37.xml><?xml version="1.0" encoding="utf-8"?>
 <p:sld xmlns:a="http://schemas.openxmlformats.org/drawingml/2006/main" xmlns:r="http://schemas.openxmlformats.org/officeDocument/2006/relationships" xmlns:p="http://schemas.openxmlformats.org/presentationml/2006/main">
   <p:cSld>
     <p:spTree>

</xml_diff>